<commit_message>
doc: 2020-02-20 공부한 내용 추가
</commit_message>
<xml_diff>
--- a/documents/팀프로젝트/팀구성_개발일정_DB설계/기능분할도_200219_1221.pptx
+++ b/documents/팀프로젝트/팀구성_개발일정_DB설계/기능분할도_200219_1221.pptx
@@ -143,7 +143,7 @@
   </p:defaultTextStyle>
   <p:extLst>
     <p:ext uri="{EFAFB233-063F-42B5-8137-9DF3F51BA10A}">
-      <p15:sldGuideLst xmlns:p15="http://schemas.microsoft.com/office/powerpoint/2012/main" xmlns="">
+      <p15:sldGuideLst xmlns="" xmlns:p15="http://schemas.microsoft.com/office/powerpoint/2012/main">
         <p15:guide id="1" orient="horz">
           <p15:clr>
             <a:srgbClr val="A4A3A4"/>
@@ -157,7 +157,7 @@
       </p15:sldGuideLst>
     </p:ext>
     <p:ext uri="{2D200454-40CA-4A62-9FC3-DE9A4176ACB9}">
-      <p15:notesGuideLst xmlns:p15="http://schemas.microsoft.com/office/powerpoint/2012/main" xmlns="">
+      <p15:notesGuideLst xmlns="" xmlns:p15="http://schemas.microsoft.com/office/powerpoint/2012/main">
         <p15:guide id="1" orient="horz" pos="3126">
           <p15:clr>
             <a:srgbClr val="A4A3A4"/>
@@ -298,7 +298,7 @@
               <a:pPr>
                 <a:defRPr/>
               </a:pPr>
-              <a:t>2020-02-19</a:t>
+              <a:t>2020-02-20</a:t>
             </a:fld>
             <a:endParaRPr lang="en-US" altLang="ko-KR"/>
           </a:p>
@@ -538,7 +538,7 @@
               <a:pPr>
                 <a:defRPr/>
               </a:pPr>
-              <a:t>2020-02-19</a:t>
+              <a:t>2020-02-20</a:t>
             </a:fld>
             <a:endParaRPr lang="en-US" altLang="ko-KR"/>
           </a:p>
@@ -2016,8 +2016,8 @@
         </p:nvCxnSpPr>
         <p:spPr bwMode="auto">
           <a:xfrm rot="16200000" flipH="1">
-            <a:off x="5275121" y="1755123"/>
-            <a:ext cx="935780" cy="1835907"/>
+            <a:off x="4292415" y="2737829"/>
+            <a:ext cx="1070716" cy="5431"/>
           </a:xfrm>
           <a:prstGeom prst="bentConnector3">
             <a:avLst>
@@ -2047,8 +2047,8 @@
         </p:nvCxnSpPr>
         <p:spPr bwMode="auto">
           <a:xfrm rot="5400000">
-            <a:off x="3556969" y="1872878"/>
-            <a:ext cx="935781" cy="1600399"/>
+            <a:off x="3215987" y="1666832"/>
+            <a:ext cx="1070717" cy="2147426"/>
           </a:xfrm>
           <a:prstGeom prst="bentConnector3">
             <a:avLst>
@@ -2076,7 +2076,7 @@
         </p:nvSpPr>
         <p:spPr bwMode="auto">
           <a:xfrm>
-            <a:off x="5961112" y="3140967"/>
+            <a:off x="4130636" y="3275903"/>
             <a:ext cx="1399706" cy="269875"/>
           </a:xfrm>
           <a:prstGeom prst="rect">
@@ -2141,7 +2141,7 @@
         </p:nvSpPr>
         <p:spPr bwMode="auto">
           <a:xfrm>
-            <a:off x="2504728" y="3140968"/>
+            <a:off x="1957701" y="3275904"/>
             <a:ext cx="1439862" cy="269875"/>
           </a:xfrm>
           <a:prstGeom prst="rect">
@@ -2206,7 +2206,7 @@
         </p:nvSpPr>
         <p:spPr bwMode="auto">
           <a:xfrm>
-            <a:off x="2720896" y="3617375"/>
+            <a:off x="2173869" y="3752311"/>
             <a:ext cx="1296000" cy="216000"/>
           </a:xfrm>
           <a:prstGeom prst="rect">
@@ -2278,7 +2278,7 @@
         </p:nvSpPr>
         <p:spPr bwMode="auto">
           <a:xfrm>
-            <a:off x="2720896" y="3992105"/>
+            <a:off x="2173869" y="4127041"/>
             <a:ext cx="1296000" cy="216000"/>
           </a:xfrm>
           <a:prstGeom prst="rect">
@@ -2360,7 +2360,7 @@
         </p:nvSpPr>
         <p:spPr bwMode="auto">
           <a:xfrm>
-            <a:off x="6249144" y="3651500"/>
+            <a:off x="4418668" y="3786436"/>
             <a:ext cx="1296000" cy="216000"/>
           </a:xfrm>
           <a:prstGeom prst="rect">
@@ -2400,7 +2400,7 @@
                 <a:latin typeface="맑은 고딕" pitchFamily="50" charset="-127"/>
                 <a:ea typeface="맑은 고딕" pitchFamily="50" charset="-127"/>
               </a:rPr>
-              <a:t>1.2.2 </a:t>
+              <a:t>1.2.1 </a:t>
             </a:r>
             <a:r>
               <a:rPr lang="ko-KR" altLang="en-US" sz="800" b="1" dirty="0" smtClean="0">
@@ -2413,24 +2413,14 @@
               <a:t>도전문제 </a:t>
             </a:r>
             <a:r>
-              <a:rPr lang="ko-KR" altLang="en-US" sz="800" dirty="0" smtClean="0">
+              <a:rPr lang="ko-KR" altLang="en-US" sz="800" b="1" dirty="0" smtClean="0">
                 <a:solidFill>
                   <a:srgbClr val="000000"/>
                 </a:solidFill>
                 <a:latin typeface="맑은 고딕" pitchFamily="50" charset="-127"/>
                 <a:ea typeface="맑은 고딕" pitchFamily="50" charset="-127"/>
               </a:rPr>
-              <a:t>현</a:t>
-            </a:r>
-            <a:r>
-              <a:rPr lang="ko-KR" altLang="en-US" sz="800" dirty="0">
-                <a:solidFill>
-                  <a:srgbClr val="000000"/>
-                </a:solidFill>
-                <a:latin typeface="맑은 고딕" pitchFamily="50" charset="-127"/>
-                <a:ea typeface="맑은 고딕" pitchFamily="50" charset="-127"/>
-              </a:rPr>
-              <a:t>황</a:t>
+              <a:t>조회</a:t>
             </a:r>
             <a:endParaRPr lang="ko-KR" altLang="en-US" sz="800" b="1" dirty="0">
               <a:solidFill>
@@ -2452,7 +2442,7 @@
         </p:nvSpPr>
         <p:spPr bwMode="auto">
           <a:xfrm>
-            <a:off x="6249144" y="4005064"/>
+            <a:off x="4418668" y="4140000"/>
             <a:ext cx="1296000" cy="216000"/>
           </a:xfrm>
           <a:prstGeom prst="rect">
@@ -2526,7 +2516,7 @@
         </p:nvCxnSpPr>
         <p:spPr bwMode="auto">
           <a:xfrm rot="16200000" flipH="1">
-            <a:off x="2333001" y="3712210"/>
+            <a:off x="1785974" y="3847146"/>
             <a:ext cx="689262" cy="86528"/>
           </a:xfrm>
           <a:prstGeom prst="bentConnector2">
@@ -2555,7 +2545,7 @@
         </p:nvCxnSpPr>
         <p:spPr bwMode="auto">
           <a:xfrm rot="16200000" flipH="1">
-            <a:off x="2520366" y="3524845"/>
+            <a:off x="1973339" y="3659781"/>
             <a:ext cx="314532" cy="86528"/>
           </a:xfrm>
           <a:prstGeom prst="bentConnector2">
@@ -2584,7 +2574,7 @@
         </p:nvCxnSpPr>
         <p:spPr bwMode="auto">
           <a:xfrm rot="16200000" flipH="1">
-            <a:off x="5830931" y="3694850"/>
+            <a:off x="4000455" y="3829786"/>
             <a:ext cx="710793" cy="125634"/>
           </a:xfrm>
           <a:prstGeom prst="bentConnector2">
@@ -2613,7 +2603,7 @@
         </p:nvCxnSpPr>
         <p:spPr bwMode="auto">
           <a:xfrm rot="16200000" flipH="1">
-            <a:off x="6007713" y="3518068"/>
+            <a:off x="4177237" y="3653004"/>
             <a:ext cx="357229" cy="125634"/>
           </a:xfrm>
           <a:prstGeom prst="bentConnector2">
@@ -2638,7 +2628,7 @@
         </p:nvSpPr>
         <p:spPr>
           <a:xfrm>
-            <a:off x="2526356" y="3195142"/>
+            <a:off x="1979329" y="3330078"/>
             <a:ext cx="216024" cy="215701"/>
           </a:xfrm>
           <a:prstGeom prst="rect">
@@ -2697,7 +2687,7 @@
         </p:nvSpPr>
         <p:spPr>
           <a:xfrm>
-            <a:off x="6015498" y="3186570"/>
+            <a:off x="4185022" y="3321506"/>
             <a:ext cx="216024" cy="215701"/>
           </a:xfrm>
           <a:prstGeom prst="rect">
@@ -2748,6 +2738,279 @@
           </a:p>
         </p:txBody>
       </p:sp>
+      <p:sp>
+        <p:nvSpPr>
+          <p:cNvPr id="20" name="Rectangle 257"/>
+          <p:cNvSpPr>
+            <a:spLocks noChangeArrowheads="1"/>
+          </p:cNvSpPr>
+          <p:nvPr/>
+        </p:nvSpPr>
+        <p:spPr bwMode="auto">
+          <a:xfrm>
+            <a:off x="6278181" y="3275903"/>
+            <a:ext cx="1399706" cy="269875"/>
+          </a:xfrm>
+          <a:prstGeom prst="rect">
+            <a:avLst/>
+          </a:prstGeom>
+          <a:solidFill>
+            <a:schemeClr val="bg1">
+              <a:lumMod val="95000"/>
+            </a:schemeClr>
+          </a:solidFill>
+          <a:ln w="9525" algn="ctr">
+            <a:solidFill>
+              <a:srgbClr val="000000"/>
+            </a:solidFill>
+            <a:miter lim="800000"/>
+            <a:headEnd type="none" w="sm" len="sm"/>
+            <a:tailEnd type="none" w="sm" len="sm"/>
+          </a:ln>
+          <a:effectLst>
+            <a:outerShdw blurRad="63500" sx="102000" sy="102000" algn="ctr" rotWithShape="0">
+              <a:prstClr val="black">
+                <a:alpha val="40000"/>
+              </a:prstClr>
+            </a:outerShdw>
+          </a:effectLst>
+        </p:spPr>
+        <p:txBody>
+          <a:bodyPr anchor="ctr" anchorCtr="1"/>
+          <a:lstStyle/>
+          <a:p>
+            <a:pPr algn="ctr" defTabSz="762000">
+              <a:defRPr/>
+            </a:pPr>
+            <a:r>
+              <a:rPr lang="en-US" altLang="ko-KR" sz="900" b="1" dirty="0" smtClean="0">
+                <a:latin typeface="맑은 고딕" pitchFamily="50" charset="-127"/>
+                <a:ea typeface="맑은 고딕" pitchFamily="50" charset="-127"/>
+              </a:rPr>
+              <a:t>1.3 </a:t>
+            </a:r>
+            <a:r>
+              <a:rPr lang="ko-KR" altLang="en-US" sz="900" b="1" dirty="0" err="1" smtClean="0">
+                <a:latin typeface="맑은 고딕" pitchFamily="50" charset="-127"/>
+                <a:ea typeface="맑은 고딕" pitchFamily="50" charset="-127"/>
+              </a:rPr>
+              <a:t>콘텐츠</a:t>
+            </a:r>
+            <a:r>
+              <a:rPr lang="ko-KR" altLang="en-US" sz="900" b="1" dirty="0" smtClean="0">
+                <a:latin typeface="맑은 고딕" pitchFamily="50" charset="-127"/>
+                <a:ea typeface="맑은 고딕" pitchFamily="50" charset="-127"/>
+              </a:rPr>
+              <a:t> 관리</a:t>
+            </a:r>
+            <a:endParaRPr lang="ko-KR" altLang="en-US" sz="900" b="1" dirty="0">
+              <a:latin typeface="맑은 고딕" pitchFamily="50" charset="-127"/>
+              <a:ea typeface="맑은 고딕" pitchFamily="50" charset="-127"/>
+            </a:endParaRPr>
+          </a:p>
+        </p:txBody>
+      </p:sp>
+      <p:sp>
+        <p:nvSpPr>
+          <p:cNvPr id="23" name="Text Box 201"/>
+          <p:cNvSpPr txBox="1">
+            <a:spLocks noChangeArrowheads="1"/>
+          </p:cNvSpPr>
+          <p:nvPr/>
+        </p:nvSpPr>
+        <p:spPr bwMode="auto">
+          <a:xfrm>
+            <a:off x="6566213" y="3786436"/>
+            <a:ext cx="1296000" cy="216000"/>
+          </a:xfrm>
+          <a:prstGeom prst="rect">
+            <a:avLst/>
+          </a:prstGeom>
+          <a:solidFill>
+            <a:schemeClr val="bg1"/>
+          </a:solidFill>
+          <a:ln w="3175" algn="ctr">
+            <a:solidFill>
+              <a:srgbClr val="000000"/>
+            </a:solidFill>
+            <a:miter lim="800000"/>
+            <a:headEnd type="none" w="sm" len="sm"/>
+            <a:tailEnd type="none" w="sm" len="sm"/>
+          </a:ln>
+          <a:effectLst>
+            <a:outerShdw blurRad="63500" sx="102000" sy="102000" algn="ctr" rotWithShape="0">
+              <a:prstClr val="black">
+                <a:alpha val="40000"/>
+              </a:prstClr>
+            </a:outerShdw>
+          </a:effectLst>
+        </p:spPr>
+        <p:txBody>
+          <a:bodyPr anchor="ctr"/>
+          <a:lstStyle/>
+          <a:p>
+            <a:pPr>
+              <a:defRPr/>
+            </a:pPr>
+            <a:r>
+              <a:rPr lang="en-US" altLang="ko-KR" sz="800" b="1" dirty="0" smtClean="0">
+                <a:solidFill>
+                  <a:srgbClr val="000000"/>
+                </a:solidFill>
+                <a:latin typeface="맑은 고딕" pitchFamily="50" charset="-127"/>
+                <a:ea typeface="맑은 고딕" pitchFamily="50" charset="-127"/>
+              </a:rPr>
+              <a:t>1.3.1 </a:t>
+            </a:r>
+            <a:r>
+              <a:rPr lang="ko-KR" altLang="en-US" sz="800" b="1" dirty="0" err="1" smtClean="0">
+                <a:solidFill>
+                  <a:srgbClr val="000000"/>
+                </a:solidFill>
+                <a:latin typeface="맑은 고딕" pitchFamily="50" charset="-127"/>
+                <a:ea typeface="맑은 고딕" pitchFamily="50" charset="-127"/>
+              </a:rPr>
+              <a:t>콘텐츠</a:t>
+            </a:r>
+            <a:r>
+              <a:rPr lang="ko-KR" altLang="en-US" sz="800" b="1" dirty="0" smtClean="0">
+                <a:solidFill>
+                  <a:srgbClr val="000000"/>
+                </a:solidFill>
+                <a:latin typeface="맑은 고딕" pitchFamily="50" charset="-127"/>
+                <a:ea typeface="맑은 고딕" pitchFamily="50" charset="-127"/>
+              </a:rPr>
+              <a:t> 추가</a:t>
+            </a:r>
+            <a:endParaRPr lang="ko-KR" altLang="en-US" sz="800" b="1" dirty="0">
+              <a:solidFill>
+                <a:srgbClr val="000000"/>
+              </a:solidFill>
+              <a:latin typeface="맑은 고딕" pitchFamily="50" charset="-127"/>
+              <a:ea typeface="맑은 고딕" pitchFamily="50" charset="-127"/>
+            </a:endParaRPr>
+          </a:p>
+        </p:txBody>
+      </p:sp>
+      <p:cxnSp>
+        <p:nvCxnSpPr>
+          <p:cNvPr id="26" name="AutoShape 259"/>
+          <p:cNvCxnSpPr>
+            <a:cxnSpLocks noChangeShapeType="1"/>
+            <a:stCxn id="27" idx="2"/>
+            <a:endCxn id="23" idx="1"/>
+          </p:cNvCxnSpPr>
+          <p:nvPr/>
+        </p:nvCxnSpPr>
+        <p:spPr bwMode="auto">
+          <a:xfrm rot="16200000" flipH="1">
+            <a:off x="6324782" y="3653004"/>
+            <a:ext cx="357229" cy="125634"/>
+          </a:xfrm>
+          <a:prstGeom prst="bentConnector2">
+            <a:avLst/>
+          </a:prstGeom>
+          <a:noFill/>
+          <a:ln w="9525">
+            <a:solidFill>
+              <a:srgbClr val="000000"/>
+            </a:solidFill>
+            <a:miter lim="800000"/>
+            <a:headEnd/>
+            <a:tailEnd/>
+          </a:ln>
+        </p:spPr>
+      </p:cxnSp>
+      <p:sp>
+        <p:nvSpPr>
+          <p:cNvPr id="27" name="직사각형 26"/>
+          <p:cNvSpPr/>
+          <p:nvPr/>
+        </p:nvSpPr>
+        <p:spPr>
+          <a:xfrm>
+            <a:off x="6332567" y="3321506"/>
+            <a:ext cx="216024" cy="215701"/>
+          </a:xfrm>
+          <a:prstGeom prst="rect">
+            <a:avLst/>
+          </a:prstGeom>
+          <a:noFill/>
+          <a:ln>
+            <a:noFill/>
+          </a:ln>
+        </p:spPr>
+        <p:style>
+          <a:lnRef idx="1">
+            <a:schemeClr val="accent5"/>
+          </a:lnRef>
+          <a:fillRef idx="2">
+            <a:schemeClr val="accent5"/>
+          </a:fillRef>
+          <a:effectRef idx="1">
+            <a:schemeClr val="accent5"/>
+          </a:effectRef>
+          <a:fontRef idx="minor">
+            <a:schemeClr val="dk1"/>
+          </a:fontRef>
+        </p:style>
+        <p:txBody>
+          <a:bodyPr wrap="square" rtlCol="0" anchor="ctr">
+            <a:noAutofit/>
+          </a:bodyPr>
+          <a:lstStyle/>
+          <a:p>
+            <a:pPr marL="177800" indent="-177800" algn="ctr">
+              <a:lnSpc>
+                <a:spcPct val="90000"/>
+              </a:lnSpc>
+              <a:spcBef>
+                <a:spcPct val="50000"/>
+              </a:spcBef>
+              <a:buFont typeface="+mj-lt"/>
+              <a:buAutoNum type="arabicPeriod"/>
+            </a:pPr>
+            <a:endParaRPr lang="ko-KR" altLang="en-US" sz="1200" dirty="0" smtClean="0">
+              <a:solidFill>
+                <a:srgbClr val="000000"/>
+              </a:solidFill>
+              <a:latin typeface="+mn-ea"/>
+              <a:ea typeface="+mn-ea"/>
+            </a:endParaRPr>
+          </a:p>
+        </p:txBody>
+      </p:sp>
+      <p:cxnSp>
+        <p:nvCxnSpPr>
+          <p:cNvPr id="29" name="AutoShape 285"/>
+          <p:cNvCxnSpPr>
+            <a:cxnSpLocks noChangeShapeType="1"/>
+            <a:stCxn id="36" idx="2"/>
+            <a:endCxn id="20" idx="0"/>
+          </p:cNvCxnSpPr>
+          <p:nvPr/>
+        </p:nvCxnSpPr>
+        <p:spPr bwMode="auto">
+          <a:xfrm rot="16200000" flipH="1">
+            <a:off x="5366188" y="1664057"/>
+            <a:ext cx="1070716" cy="2152976"/>
+          </a:xfrm>
+          <a:prstGeom prst="bentConnector3">
+            <a:avLst>
+              <a:gd name="adj1" fmla="val 50000"/>
+            </a:avLst>
+          </a:prstGeom>
+          <a:noFill/>
+          <a:ln w="9525">
+            <a:solidFill>
+              <a:srgbClr val="000000"/>
+            </a:solidFill>
+            <a:miter lim="800000"/>
+            <a:headEnd/>
+            <a:tailEnd/>
+          </a:ln>
+        </p:spPr>
+      </p:cxnSp>
     </p:spTree>
     <p:extLst>
       <p:ext uri="{BB962C8B-B14F-4D97-AF65-F5344CB8AC3E}">

</xml_diff>